<commit_message>
week 6 slides update
</commit_message>
<xml_diff>
--- a/Week-6-Regresion/IS6400 Week 6.pptx
+++ b/Week-6-Regresion/IS6400 Week 6.pptx
@@ -5,10 +5,10 @@
     <p:sldMasterId id="2147483672" r:id="rId1"/>
   </p:sldMasterIdLst>
   <p:notesMasterIdLst>
-    <p:notesMasterId r:id="rId53"/>
+    <p:notesMasterId r:id="rId54"/>
   </p:notesMasterIdLst>
   <p:handoutMasterIdLst>
-    <p:handoutMasterId r:id="rId54"/>
+    <p:handoutMasterId r:id="rId55"/>
   </p:handoutMasterIdLst>
   <p:sldIdLst>
     <p:sldId id="300" r:id="rId2"/>
@@ -54,14 +54,15 @@
     <p:sldId id="489" r:id="rId42"/>
     <p:sldId id="490" r:id="rId43"/>
     <p:sldId id="491" r:id="rId44"/>
-    <p:sldId id="492" r:id="rId45"/>
-    <p:sldId id="493" r:id="rId46"/>
-    <p:sldId id="494" r:id="rId47"/>
-    <p:sldId id="495" r:id="rId48"/>
-    <p:sldId id="496" r:id="rId49"/>
-    <p:sldId id="497" r:id="rId50"/>
-    <p:sldId id="450" r:id="rId51"/>
-    <p:sldId id="317" r:id="rId52"/>
+    <p:sldId id="501" r:id="rId45"/>
+    <p:sldId id="492" r:id="rId46"/>
+    <p:sldId id="493" r:id="rId47"/>
+    <p:sldId id="494" r:id="rId48"/>
+    <p:sldId id="495" r:id="rId49"/>
+    <p:sldId id="496" r:id="rId50"/>
+    <p:sldId id="497" r:id="rId51"/>
+    <p:sldId id="450" r:id="rId52"/>
+    <p:sldId id="317" r:id="rId53"/>
   </p:sldIdLst>
   <p:sldSz cx="9144000" cy="6858000" type="screen4x3"/>
   <p:notesSz cx="6797675" cy="9926638"/>
@@ -338,7 +339,7 @@
               <a:pPr>
                 <a:defRPr/>
               </a:pPr>
-              <a:t>2022/3/1</a:t>
+              <a:t>2022/3/2</a:t>
             </a:fld>
             <a:endParaRPr lang="zh-TW" altLang="en-US"/>
           </a:p>
@@ -579,7 +580,7 @@
               <a:pPr>
                 <a:defRPr/>
               </a:pPr>
-              <a:t>3/1/22</a:t>
+              <a:t>3/2/22</a:t>
             </a:fld>
             <a:endParaRPr lang="en-US" dirty="0"/>
           </a:p>
@@ -1656,7 +1657,7 @@
                   <a:spcPct val="0"/>
                 </a:spcBef>
               </a:pPr>
-              <a:t>51</a:t>
+              <a:t>52</a:t>
             </a:fld>
             <a:endParaRPr lang="en-US" altLang="en-US"/>
           </a:p>
@@ -3908,7 +3909,7 @@
           <a:blip r:embed="rId2">
             <a:extLst>
               <a:ext uri="{28A0092B-C50C-407E-A947-70E740481C1C}">
-                <a14:useLocalDpi xmlns:a14="http://schemas.microsoft.com/office/drawing/2010/main" val="0"/>
+                <a14:useLocalDpi xmlns:a14="http://schemas.microsoft.com/office/drawing/2010/main"/>
               </a:ext>
               <a:ext uri="{96DAC541-7B7A-43D3-8B79-37D633B846F1}">
                 <asvg:svgBlip xmlns:asvg="http://schemas.microsoft.com/office/drawing/2016/SVG/main" r:embed="rId3"/>
@@ -7556,7 +7557,13 @@
           <p:nvPr/>
         </p:nvPicPr>
         <p:blipFill>
-          <a:blip r:embed="rId3"/>
+          <a:blip r:embed="rId3" cstate="screen">
+            <a:extLst>
+              <a:ext uri="{28A0092B-C50C-407E-A947-70E740481C1C}">
+                <a14:useLocalDpi xmlns:a14="http://schemas.microsoft.com/office/drawing/2010/main"/>
+              </a:ext>
+            </a:extLst>
+          </a:blip>
           <a:stretch>
             <a:fillRect/>
           </a:stretch>
@@ -7684,8 +7691,14 @@
           <p:nvPr/>
         </p:nvPicPr>
         <p:blipFill rotWithShape="1">
-          <a:blip r:embed="rId3"/>
-          <a:srcRect t="3854"/>
+          <a:blip r:embed="rId3" cstate="screen">
+            <a:extLst>
+              <a:ext uri="{28A0092B-C50C-407E-A947-70E740481C1C}">
+                <a14:useLocalDpi xmlns:a14="http://schemas.microsoft.com/office/drawing/2010/main"/>
+              </a:ext>
+            </a:extLst>
+          </a:blip>
+          <a:srcRect/>
           <a:stretch/>
         </p:blipFill>
         <p:spPr bwMode="auto">
@@ -8400,7 +8413,13 @@
           </p:nvPr>
         </p:nvPicPr>
         <p:blipFill>
-          <a:blip r:embed="rId3"/>
+          <a:blip r:embed="rId3" cstate="screen">
+            <a:extLst>
+              <a:ext uri="{28A0092B-C50C-407E-A947-70E740481C1C}">
+                <a14:useLocalDpi xmlns:a14="http://schemas.microsoft.com/office/drawing/2010/main"/>
+              </a:ext>
+            </a:extLst>
+          </a:blip>
           <a:stretch>
             <a:fillRect/>
           </a:stretch>
@@ -8632,8 +8651,14 @@
           </p:nvPr>
         </p:nvPicPr>
         <p:blipFill rotWithShape="1">
-          <a:blip r:embed="rId2"/>
-          <a:srcRect t="3854"/>
+          <a:blip r:embed="rId2" cstate="screen">
+            <a:extLst>
+              <a:ext uri="{28A0092B-C50C-407E-A947-70E740481C1C}">
+                <a14:useLocalDpi xmlns:a14="http://schemas.microsoft.com/office/drawing/2010/main"/>
+              </a:ext>
+            </a:extLst>
+          </a:blip>
+          <a:srcRect/>
           <a:stretch/>
         </p:blipFill>
         <p:spPr bwMode="auto">
@@ -9065,8 +9090,14 @@
           </p:nvPr>
         </p:nvPicPr>
         <p:blipFill rotWithShape="1">
-          <a:blip r:embed="rId2"/>
-          <a:srcRect t="3854"/>
+          <a:blip r:embed="rId2" cstate="screen">
+            <a:extLst>
+              <a:ext uri="{28A0092B-C50C-407E-A947-70E740481C1C}">
+                <a14:useLocalDpi xmlns:a14="http://schemas.microsoft.com/office/drawing/2010/main"/>
+              </a:ext>
+            </a:extLst>
+          </a:blip>
+          <a:srcRect/>
           <a:stretch/>
         </p:blipFill>
         <p:spPr bwMode="auto">
@@ -9593,7 +9624,13 @@
           </p:nvPr>
         </p:nvPicPr>
         <p:blipFill>
-          <a:blip r:embed="rId2"/>
+          <a:blip r:embed="rId2" cstate="screen">
+            <a:extLst>
+              <a:ext uri="{28A0092B-C50C-407E-A947-70E740481C1C}">
+                <a14:useLocalDpi xmlns:a14="http://schemas.microsoft.com/office/drawing/2010/main"/>
+              </a:ext>
+            </a:extLst>
+          </a:blip>
           <a:stretch>
             <a:fillRect/>
           </a:stretch>
@@ -9683,8 +9720,14 @@
           </p:nvPr>
         </p:nvPicPr>
         <p:blipFill rotWithShape="1">
-          <a:blip r:embed="rId2"/>
-          <a:srcRect t="3854"/>
+          <a:blip r:embed="rId2" cstate="screen">
+            <a:extLst>
+              <a:ext uri="{28A0092B-C50C-407E-A947-70E740481C1C}">
+                <a14:useLocalDpi xmlns:a14="http://schemas.microsoft.com/office/drawing/2010/main"/>
+              </a:ext>
+            </a:extLst>
+          </a:blip>
+          <a:srcRect/>
           <a:stretch/>
         </p:blipFill>
         <p:spPr bwMode="auto">
@@ -11489,8 +11532,14 @@
           <p:nvPr/>
         </p:nvPicPr>
         <p:blipFill rotWithShape="1">
-          <a:blip r:embed="rId5"/>
-          <a:srcRect t="8955"/>
+          <a:blip r:embed="rId5" cstate="screen">
+            <a:extLst>
+              <a:ext uri="{28A0092B-C50C-407E-A947-70E740481C1C}">
+                <a14:useLocalDpi xmlns:a14="http://schemas.microsoft.com/office/drawing/2010/main"/>
+              </a:ext>
+            </a:extLst>
+          </a:blip>
+          <a:srcRect/>
           <a:stretch/>
         </p:blipFill>
         <p:spPr>
@@ -12148,7 +12197,7 @@
             <a:blip r:embed="rId4">
               <a:extLst>
                 <a:ext uri="{28A0092B-C50C-407E-A947-70E740481C1C}">
-                  <a14:useLocalDpi xmlns:a14="http://schemas.microsoft.com/office/drawing/2010/main" val="0"/>
+                  <a14:useLocalDpi xmlns:a14="http://schemas.microsoft.com/office/drawing/2010/main"/>
                 </a:ext>
                 <a:ext uri="{96DAC541-7B7A-43D3-8B79-37D633B846F1}">
                   <asvg:svgBlip xmlns:asvg="http://schemas.microsoft.com/office/drawing/2016/SVG/main" r:embed="rId5"/>
@@ -12986,7 +13035,7 @@
             <a:blip r:embed="rId2">
               <a:extLst>
                 <a:ext uri="{28A0092B-C50C-407E-A947-70E740481C1C}">
-                  <a14:useLocalDpi xmlns:a14="http://schemas.microsoft.com/office/drawing/2010/main" val="0"/>
+                  <a14:useLocalDpi xmlns:a14="http://schemas.microsoft.com/office/drawing/2010/main"/>
                 </a:ext>
                 <a:ext uri="{96DAC541-7B7A-43D3-8B79-37D633B846F1}">
                   <asvg:svgBlip xmlns:asvg="http://schemas.microsoft.com/office/drawing/2016/SVG/main" r:embed="rId3"/>
@@ -13875,7 +13924,7 @@
           <a:blip r:embed="rId2">
             <a:extLst>
               <a:ext uri="{28A0092B-C50C-407E-A947-70E740481C1C}">
-                <a14:useLocalDpi xmlns:a14="http://schemas.microsoft.com/office/drawing/2010/main" val="0"/>
+                <a14:useLocalDpi xmlns:a14="http://schemas.microsoft.com/office/drawing/2010/main"/>
               </a:ext>
               <a:ext uri="{96DAC541-7B7A-43D3-8B79-37D633B846F1}">
                 <asvg:svgBlip xmlns:asvg="http://schemas.microsoft.com/office/drawing/2016/SVG/main" r:embed="rId3"/>
@@ -13914,7 +13963,7 @@
           <a:blip r:embed="rId4">
             <a:extLst>
               <a:ext uri="{28A0092B-C50C-407E-A947-70E740481C1C}">
-                <a14:useLocalDpi xmlns:a14="http://schemas.microsoft.com/office/drawing/2010/main" val="0"/>
+                <a14:useLocalDpi xmlns:a14="http://schemas.microsoft.com/office/drawing/2010/main"/>
               </a:ext>
               <a:ext uri="{96DAC541-7B7A-43D3-8B79-37D633B846F1}">
                 <asvg:svgBlip xmlns:asvg="http://schemas.microsoft.com/office/drawing/2016/SVG/main" r:embed="rId5"/>
@@ -15614,7 +15663,7 @@
           <a:blip r:embed="rId2">
             <a:extLst>
               <a:ext uri="{28A0092B-C50C-407E-A947-70E740481C1C}">
-                <a14:useLocalDpi xmlns:a14="http://schemas.microsoft.com/office/drawing/2010/main" val="0"/>
+                <a14:useLocalDpi xmlns:a14="http://schemas.microsoft.com/office/drawing/2010/main"/>
               </a:ext>
               <a:ext uri="{96DAC541-7B7A-43D3-8B79-37D633B846F1}">
                 <asvg:svgBlip xmlns:asvg="http://schemas.microsoft.com/office/drawing/2016/SVG/main" r:embed="rId3"/>
@@ -15653,7 +15702,7 @@
           <a:blip r:embed="rId4">
             <a:extLst>
               <a:ext uri="{28A0092B-C50C-407E-A947-70E740481C1C}">
-                <a14:useLocalDpi xmlns:a14="http://schemas.microsoft.com/office/drawing/2010/main" val="0"/>
+                <a14:useLocalDpi xmlns:a14="http://schemas.microsoft.com/office/drawing/2010/main"/>
               </a:ext>
               <a:ext uri="{96DAC541-7B7A-43D3-8B79-37D633B846F1}">
                 <asvg:svgBlip xmlns:asvg="http://schemas.microsoft.com/office/drawing/2016/SVG/main" r:embed="rId5"/>
@@ -16668,7 +16717,7 @@
           <a:blip r:embed="rId2">
             <a:extLst>
               <a:ext uri="{28A0092B-C50C-407E-A947-70E740481C1C}">
-                <a14:useLocalDpi xmlns:a14="http://schemas.microsoft.com/office/drawing/2010/main" val="0"/>
+                <a14:useLocalDpi xmlns:a14="http://schemas.microsoft.com/office/drawing/2010/main"/>
               </a:ext>
               <a:ext uri="{96DAC541-7B7A-43D3-8B79-37D633B846F1}">
                 <asvg:svgBlip xmlns:asvg="http://schemas.microsoft.com/office/drawing/2016/SVG/main" r:embed="rId3"/>
@@ -16707,7 +16756,7 @@
           <a:blip r:embed="rId4">
             <a:extLst>
               <a:ext uri="{28A0092B-C50C-407E-A947-70E740481C1C}">
-                <a14:useLocalDpi xmlns:a14="http://schemas.microsoft.com/office/drawing/2010/main" val="0"/>
+                <a14:useLocalDpi xmlns:a14="http://schemas.microsoft.com/office/drawing/2010/main"/>
               </a:ext>
               <a:ext uri="{96DAC541-7B7A-43D3-8B79-37D633B846F1}">
                 <asvg:svgBlip xmlns:asvg="http://schemas.microsoft.com/office/drawing/2016/SVG/main" r:embed="rId5"/>
@@ -17722,7 +17771,7 @@
           <a:blip r:embed="rId2">
             <a:extLst>
               <a:ext uri="{28A0092B-C50C-407E-A947-70E740481C1C}">
-                <a14:useLocalDpi xmlns:a14="http://schemas.microsoft.com/office/drawing/2010/main" val="0"/>
+                <a14:useLocalDpi xmlns:a14="http://schemas.microsoft.com/office/drawing/2010/main"/>
               </a:ext>
               <a:ext uri="{96DAC541-7B7A-43D3-8B79-37D633B846F1}">
                 <asvg:svgBlip xmlns:asvg="http://schemas.microsoft.com/office/drawing/2016/SVG/main" r:embed="rId3"/>
@@ -17761,7 +17810,7 @@
           <a:blip r:embed="rId4">
             <a:extLst>
               <a:ext uri="{28A0092B-C50C-407E-A947-70E740481C1C}">
-                <a14:useLocalDpi xmlns:a14="http://schemas.microsoft.com/office/drawing/2010/main" val="0"/>
+                <a14:useLocalDpi xmlns:a14="http://schemas.microsoft.com/office/drawing/2010/main"/>
               </a:ext>
               <a:ext uri="{96DAC541-7B7A-43D3-8B79-37D633B846F1}">
                 <asvg:svgBlip xmlns:asvg="http://schemas.microsoft.com/office/drawing/2016/SVG/main" r:embed="rId5"/>
@@ -19285,6 +19334,70 @@
           </a:fontRef>
         </p:style>
       </p:cxnSp>
+      <p:sp>
+        <p:nvSpPr>
+          <p:cNvPr id="9" name="Rounded Rectangular Callout 8">
+            <a:extLst>
+              <a:ext uri="{FF2B5EF4-FFF2-40B4-BE49-F238E27FC236}">
+                <a16:creationId xmlns:a16="http://schemas.microsoft.com/office/drawing/2014/main" id="{EB5841EB-AF3C-8147-AC13-2A8C73767BBD}"/>
+              </a:ext>
+            </a:extLst>
+          </p:cNvPr>
+          <p:cNvSpPr/>
+          <p:nvPr/>
+        </p:nvSpPr>
+        <p:spPr>
+          <a:xfrm>
+            <a:off x="6300193" y="5715000"/>
+            <a:ext cx="2843807" cy="1143000"/>
+          </a:xfrm>
+          <a:prstGeom prst="wedgeRoundRectCallout">
+            <a:avLst>
+              <a:gd name="adj1" fmla="val -34016"/>
+              <a:gd name="adj2" fmla="val -68562"/>
+              <a:gd name="adj3" fmla="val 16667"/>
+            </a:avLst>
+          </a:prstGeom>
+          <a:solidFill>
+            <a:schemeClr val="accent6">
+              <a:lumMod val="60000"/>
+              <a:lumOff val="40000"/>
+            </a:schemeClr>
+          </a:solidFill>
+          <a:ln>
+            <a:noFill/>
+          </a:ln>
+        </p:spPr>
+        <p:style>
+          <a:lnRef idx="2">
+            <a:schemeClr val="accent1">
+              <a:shade val="50000"/>
+            </a:schemeClr>
+          </a:lnRef>
+          <a:fillRef idx="1">
+            <a:schemeClr val="accent1"/>
+          </a:fillRef>
+          <a:effectRef idx="0">
+            <a:schemeClr val="accent1"/>
+          </a:effectRef>
+          <a:fontRef idx="minor">
+            <a:schemeClr val="lt1"/>
+          </a:fontRef>
+        </p:style>
+        <p:txBody>
+          <a:bodyPr rtlCol="0" anchor="ctr"/>
+          <a:lstStyle/>
+          <a:p>
+            <a:r>
+              <a:rPr lang="en-US" dirty="0">
+                <a:latin typeface="Calibri Light" panose="020F0302020204030204" pitchFamily="34" charset="0"/>
+                <a:cs typeface="Calibri Light" panose="020F0302020204030204" pitchFamily="34" charset="0"/>
+              </a:rPr>
+              <a:t>Ridge regression (i.e., linear regression with L-2 norm regularization)</a:t>
+            </a:r>
+          </a:p>
+        </p:txBody>
+      </p:sp>
     </p:spTree>
     <p:extLst>
       <p:ext uri="{BB962C8B-B14F-4D97-AF65-F5344CB8AC3E}">
@@ -19375,6 +19488,51 @@
                       </p:childTnLst>
                     </p:cTn>
                   </p:par>
+                  <p:par>
+                    <p:cTn id="9" fill="hold">
+                      <p:stCondLst>
+                        <p:cond delay="indefinite"/>
+                      </p:stCondLst>
+                      <p:childTnLst>
+                        <p:par>
+                          <p:cTn id="10" fill="hold">
+                            <p:stCondLst>
+                              <p:cond delay="0"/>
+                            </p:stCondLst>
+                            <p:childTnLst>
+                              <p:par>
+                                <p:cTn id="11" presetID="1" presetClass="entr" presetSubtype="0" fill="hold" grpId="0" nodeType="clickEffect">
+                                  <p:stCondLst>
+                                    <p:cond delay="0"/>
+                                  </p:stCondLst>
+                                  <p:childTnLst>
+                                    <p:set>
+                                      <p:cBhvr>
+                                        <p:cTn id="12" dur="1" fill="hold">
+                                          <p:stCondLst>
+                                            <p:cond delay="0"/>
+                                          </p:stCondLst>
+                                        </p:cTn>
+                                        <p:tgtEl>
+                                          <p:spTgt spid="9"/>
+                                        </p:tgtEl>
+                                        <p:attrNameLst>
+                                          <p:attrName>style.visibility</p:attrName>
+                                        </p:attrNameLst>
+                                      </p:cBhvr>
+                                      <p:to>
+                                        <p:strVal val="visible"/>
+                                      </p:to>
+                                    </p:set>
+                                  </p:childTnLst>
+                                </p:cTn>
+                              </p:par>
+                            </p:childTnLst>
+                          </p:cTn>
+                        </p:par>
+                      </p:childTnLst>
+                    </p:cTn>
+                  </p:par>
                 </p:childTnLst>
               </p:cTn>
               <p:prevCondLst>
@@ -19396,11 +19554,664 @@
         </p:cTn>
       </p:par>
     </p:tnLst>
+    <p:bldLst>
+      <p:bldP spid="9" grpId="0" animBg="1"/>
+    </p:bldLst>
   </p:timing>
 </p:sld>
 </file>
 
 <file path=ppt/slides/slide44.xml><?xml version="1.0" encoding="utf-8"?>
+<p:sld xmlns:a="http://schemas.openxmlformats.org/drawingml/2006/main" xmlns:r="http://schemas.openxmlformats.org/officeDocument/2006/relationships" xmlns:p="http://schemas.openxmlformats.org/presentationml/2006/main">
+  <p:cSld>
+    <p:spTree>
+      <p:nvGrpSpPr>
+        <p:cNvPr id="1" name=""/>
+        <p:cNvGrpSpPr/>
+        <p:nvPr/>
+      </p:nvGrpSpPr>
+      <p:grpSpPr>
+        <a:xfrm>
+          <a:off x="0" y="0"/>
+          <a:ext cx="0" cy="0"/>
+          <a:chOff x="0" y="0"/>
+          <a:chExt cx="0" cy="0"/>
+        </a:xfrm>
+      </p:grpSpPr>
+      <p:sp>
+        <p:nvSpPr>
+          <p:cNvPr id="2" name="Title 1">
+            <a:extLst>
+              <a:ext uri="{FF2B5EF4-FFF2-40B4-BE49-F238E27FC236}">
+                <a16:creationId xmlns:a16="http://schemas.microsoft.com/office/drawing/2014/main" id="{B7304DE4-B8C2-2346-90BC-CED31D615CA2}"/>
+              </a:ext>
+            </a:extLst>
+          </p:cNvPr>
+          <p:cNvSpPr>
+            <a:spLocks noGrp="1"/>
+          </p:cNvSpPr>
+          <p:nvPr>
+            <p:ph type="title"/>
+          </p:nvPr>
+        </p:nvSpPr>
+        <p:spPr/>
+        <p:txBody>
+          <a:bodyPr/>
+          <a:lstStyle/>
+          <a:p>
+            <a:r>
+              <a:rPr lang="en-US" dirty="0"/>
+              <a:t>Regularization: Lasso and Elastic Net</a:t>
+            </a:r>
+          </a:p>
+        </p:txBody>
+      </p:sp>
+      <p:pic>
+        <p:nvPicPr>
+          <p:cNvPr id="4" name="Content Placeholder 3">
+            <a:extLst>
+              <a:ext uri="{FF2B5EF4-FFF2-40B4-BE49-F238E27FC236}">
+                <a16:creationId xmlns:a16="http://schemas.microsoft.com/office/drawing/2014/main" id="{CDE91B59-D982-7945-8BAD-70ADB62C54E9}"/>
+              </a:ext>
+            </a:extLst>
+          </p:cNvPr>
+          <p:cNvPicPr>
+            <a:picLocks noGrp="1" noChangeAspect="1"/>
+          </p:cNvPicPr>
+          <p:nvPr>
+            <p:ph idx="1"/>
+          </p:nvPr>
+        </p:nvPicPr>
+        <p:blipFill rotWithShape="1">
+          <a:blip r:embed="rId2" cstate="screen">
+            <a:extLst>
+              <a:ext uri="{28A0092B-C50C-407E-A947-70E740481C1C}">
+                <a14:useLocalDpi xmlns:a14="http://schemas.microsoft.com/office/drawing/2010/main"/>
+              </a:ext>
+            </a:extLst>
+          </a:blip>
+          <a:srcRect t="-1" b="-3089"/>
+          <a:stretch/>
+        </p:blipFill>
+        <p:spPr>
+          <a:xfrm>
+            <a:off x="611560" y="2132856"/>
+            <a:ext cx="4104015" cy="576064"/>
+          </a:xfrm>
+          <a:prstGeom prst="rect">
+            <a:avLst/>
+          </a:prstGeom>
+        </p:spPr>
+      </p:pic>
+      <p:pic>
+        <p:nvPicPr>
+          <p:cNvPr id="5" name="Content Placeholder 3">
+            <a:extLst>
+              <a:ext uri="{FF2B5EF4-FFF2-40B4-BE49-F238E27FC236}">
+                <a16:creationId xmlns:a16="http://schemas.microsoft.com/office/drawing/2014/main" id="{C6738CB7-765C-F246-B27D-D97626BD9499}"/>
+              </a:ext>
+            </a:extLst>
+          </p:cNvPr>
+          <p:cNvPicPr>
+            <a:picLocks noChangeAspect="1"/>
+          </p:cNvPicPr>
+          <p:nvPr/>
+        </p:nvPicPr>
+        <p:blipFill rotWithShape="1">
+          <a:blip r:embed="rId2" cstate="screen">
+            <a:extLst>
+              <a:ext uri="{28A0092B-C50C-407E-A947-70E740481C1C}">
+                <a14:useLocalDpi xmlns:a14="http://schemas.microsoft.com/office/drawing/2010/main"/>
+              </a:ext>
+            </a:extLst>
+          </a:blip>
+          <a:srcRect t="-1" b="-3089"/>
+          <a:stretch/>
+        </p:blipFill>
+        <p:spPr bwMode="auto">
+          <a:xfrm>
+            <a:off x="638641" y="4592593"/>
+            <a:ext cx="4104456" cy="576064"/>
+          </a:xfrm>
+          <a:prstGeom prst="rect">
+            <a:avLst/>
+          </a:prstGeom>
+          <a:noFill/>
+          <a:ln>
+            <a:noFill/>
+          </a:ln>
+          <a:extLst>
+            <a:ext uri="{909E8E84-426E-40DD-AFC4-6F175D3DCCD1}">
+              <a14:hiddenFill xmlns:a14="http://schemas.microsoft.com/office/drawing/2010/main">
+                <a:solidFill>
+                  <a:srgbClr val="FFFFFF"/>
+                </a:solidFill>
+              </a14:hiddenFill>
+            </a:ext>
+            <a:ext uri="{91240B29-F687-4F45-9708-019B960494DF}">
+              <a14:hiddenLine xmlns:a14="http://schemas.microsoft.com/office/drawing/2010/main" w="9525">
+                <a:solidFill>
+                  <a:srgbClr val="000000"/>
+                </a:solidFill>
+                <a:miter lim="800000"/>
+                <a:headEnd/>
+                <a:tailEnd/>
+              </a14:hiddenLine>
+            </a:ext>
+          </a:extLst>
+        </p:spPr>
+      </p:pic>
+      <p:pic>
+        <p:nvPicPr>
+          <p:cNvPr id="6" name="Content Placeholder 3">
+            <a:extLst>
+              <a:ext uri="{FF2B5EF4-FFF2-40B4-BE49-F238E27FC236}">
+                <a16:creationId xmlns:a16="http://schemas.microsoft.com/office/drawing/2014/main" id="{4F727D28-397A-4B4B-9AA3-484B62B8C154}"/>
+              </a:ext>
+            </a:extLst>
+          </p:cNvPr>
+          <p:cNvPicPr>
+            <a:picLocks noChangeAspect="1"/>
+          </p:cNvPicPr>
+          <p:nvPr/>
+        </p:nvPicPr>
+        <p:blipFill rotWithShape="1">
+          <a:blip r:embed="rId3" cstate="screen">
+            <a:extLst>
+              <a:ext uri="{28A0092B-C50C-407E-A947-70E740481C1C}">
+                <a14:useLocalDpi xmlns:a14="http://schemas.microsoft.com/office/drawing/2010/main"/>
+              </a:ext>
+            </a:extLst>
+          </a:blip>
+          <a:srcRect t="-1" b="-3089"/>
+          <a:stretch/>
+        </p:blipFill>
+        <p:spPr bwMode="auto">
+          <a:xfrm>
+            <a:off x="4743097" y="4592593"/>
+            <a:ext cx="1008112" cy="576064"/>
+          </a:xfrm>
+          <a:prstGeom prst="rect">
+            <a:avLst/>
+          </a:prstGeom>
+          <a:noFill/>
+          <a:ln>
+            <a:noFill/>
+          </a:ln>
+          <a:extLst>
+            <a:ext uri="{909E8E84-426E-40DD-AFC4-6F175D3DCCD1}">
+              <a14:hiddenFill xmlns:a14="http://schemas.microsoft.com/office/drawing/2010/main">
+                <a:solidFill>
+                  <a:srgbClr val="FFFFFF"/>
+                </a:solidFill>
+              </a14:hiddenFill>
+            </a:ext>
+            <a:ext uri="{91240B29-F687-4F45-9708-019B960494DF}">
+              <a14:hiddenLine xmlns:a14="http://schemas.microsoft.com/office/drawing/2010/main" w="9525">
+                <a:solidFill>
+                  <a:srgbClr val="000000"/>
+                </a:solidFill>
+                <a:miter lim="800000"/>
+                <a:headEnd/>
+                <a:tailEnd/>
+              </a14:hiddenLine>
+            </a:ext>
+          </a:extLst>
+        </p:spPr>
+      </p:pic>
+      <p:sp>
+        <p:nvSpPr>
+          <p:cNvPr id="7" name="Rounded Rectangular Callout 6">
+            <a:extLst>
+              <a:ext uri="{FF2B5EF4-FFF2-40B4-BE49-F238E27FC236}">
+                <a16:creationId xmlns:a16="http://schemas.microsoft.com/office/drawing/2014/main" id="{753C0334-4979-E749-B20B-8C952E88C140}"/>
+              </a:ext>
+            </a:extLst>
+          </p:cNvPr>
+          <p:cNvSpPr/>
+          <p:nvPr/>
+        </p:nvSpPr>
+        <p:spPr>
+          <a:xfrm>
+            <a:off x="5219631" y="1849388"/>
+            <a:ext cx="2843807" cy="1143000"/>
+          </a:xfrm>
+          <a:prstGeom prst="wedgeRoundRectCallout">
+            <a:avLst>
+              <a:gd name="adj1" fmla="val -64322"/>
+              <a:gd name="adj2" fmla="val -516"/>
+              <a:gd name="adj3" fmla="val 16667"/>
+            </a:avLst>
+          </a:prstGeom>
+          <a:solidFill>
+            <a:schemeClr val="accent6">
+              <a:lumMod val="60000"/>
+              <a:lumOff val="40000"/>
+            </a:schemeClr>
+          </a:solidFill>
+          <a:ln>
+            <a:noFill/>
+          </a:ln>
+        </p:spPr>
+        <p:style>
+          <a:lnRef idx="2">
+            <a:schemeClr val="accent1">
+              <a:shade val="50000"/>
+            </a:schemeClr>
+          </a:lnRef>
+          <a:fillRef idx="1">
+            <a:schemeClr val="accent1"/>
+          </a:fillRef>
+          <a:effectRef idx="0">
+            <a:schemeClr val="accent1"/>
+          </a:effectRef>
+          <a:fontRef idx="minor">
+            <a:schemeClr val="lt1"/>
+          </a:fontRef>
+        </p:style>
+        <p:txBody>
+          <a:bodyPr rtlCol="0" anchor="ctr"/>
+          <a:lstStyle/>
+          <a:p>
+            <a:r>
+              <a:rPr lang="en-US" dirty="0">
+                <a:latin typeface="Calibri Light" panose="020F0302020204030204" pitchFamily="34" charset="0"/>
+                <a:cs typeface="Calibri Light" panose="020F0302020204030204" pitchFamily="34" charset="0"/>
+              </a:rPr>
+              <a:t>Lasso regression (i.e., linear regression with L-1 norm regularization)</a:t>
+            </a:r>
+          </a:p>
+        </p:txBody>
+      </p:sp>
+      <p:sp>
+        <p:nvSpPr>
+          <p:cNvPr id="8" name="Rounded Rectangular Callout 7">
+            <a:extLst>
+              <a:ext uri="{FF2B5EF4-FFF2-40B4-BE49-F238E27FC236}">
+                <a16:creationId xmlns:a16="http://schemas.microsoft.com/office/drawing/2014/main" id="{0AEB6BA6-33BB-2D49-9FF3-0C22DAEA7E83}"/>
+              </a:ext>
+            </a:extLst>
+          </p:cNvPr>
+          <p:cNvSpPr/>
+          <p:nvPr/>
+        </p:nvSpPr>
+        <p:spPr>
+          <a:xfrm>
+            <a:off x="5535627" y="5381491"/>
+            <a:ext cx="3456384" cy="1143000"/>
+          </a:xfrm>
+          <a:prstGeom prst="wedgeRoundRectCallout">
+            <a:avLst>
+              <a:gd name="adj1" fmla="val -61735"/>
+              <a:gd name="adj2" fmla="val -74999"/>
+              <a:gd name="adj3" fmla="val 16667"/>
+            </a:avLst>
+          </a:prstGeom>
+          <a:solidFill>
+            <a:schemeClr val="accent6">
+              <a:lumMod val="60000"/>
+              <a:lumOff val="40000"/>
+            </a:schemeClr>
+          </a:solidFill>
+          <a:ln>
+            <a:noFill/>
+          </a:ln>
+        </p:spPr>
+        <p:style>
+          <a:lnRef idx="2">
+            <a:schemeClr val="accent1">
+              <a:shade val="50000"/>
+            </a:schemeClr>
+          </a:lnRef>
+          <a:fillRef idx="1">
+            <a:schemeClr val="accent1"/>
+          </a:fillRef>
+          <a:effectRef idx="0">
+            <a:schemeClr val="accent1"/>
+          </a:effectRef>
+          <a:fontRef idx="minor">
+            <a:schemeClr val="lt1"/>
+          </a:fontRef>
+        </p:style>
+        <p:txBody>
+          <a:bodyPr rtlCol="0" anchor="ctr"/>
+          <a:lstStyle/>
+          <a:p>
+            <a:r>
+              <a:rPr lang="en-US" dirty="0">
+                <a:latin typeface="Calibri Light" panose="020F0302020204030204" pitchFamily="34" charset="0"/>
+                <a:cs typeface="Calibri Light" panose="020F0302020204030204" pitchFamily="34" charset="0"/>
+              </a:rPr>
+              <a:t>Elastic net regression (i.e., linear regression with L-1and L-2 norm regularization)</a:t>
+            </a:r>
+          </a:p>
+        </p:txBody>
+      </p:sp>
+      <p:sp>
+        <p:nvSpPr>
+          <p:cNvPr id="9" name="Explosion 1 8">
+            <a:extLst>
+              <a:ext uri="{FF2B5EF4-FFF2-40B4-BE49-F238E27FC236}">
+                <a16:creationId xmlns:a16="http://schemas.microsoft.com/office/drawing/2014/main" id="{333FB359-2597-BB4C-9131-00860FA52612}"/>
+              </a:ext>
+            </a:extLst>
+          </p:cNvPr>
+          <p:cNvSpPr/>
+          <p:nvPr/>
+        </p:nvSpPr>
+        <p:spPr>
+          <a:xfrm>
+            <a:off x="1334815" y="2444748"/>
+            <a:ext cx="2712108" cy="2147845"/>
+          </a:xfrm>
+          <a:prstGeom prst="irregularSeal1">
+            <a:avLst/>
+          </a:prstGeom>
+          <a:solidFill>
+            <a:schemeClr val="accent5">
+              <a:lumMod val="60000"/>
+              <a:lumOff val="40000"/>
+            </a:schemeClr>
+          </a:solidFill>
+          <a:ln>
+            <a:noFill/>
+          </a:ln>
+        </p:spPr>
+        <p:style>
+          <a:lnRef idx="2">
+            <a:schemeClr val="accent1">
+              <a:shade val="50000"/>
+            </a:schemeClr>
+          </a:lnRef>
+          <a:fillRef idx="1">
+            <a:schemeClr val="accent1"/>
+          </a:fillRef>
+          <a:effectRef idx="0">
+            <a:schemeClr val="accent1"/>
+          </a:effectRef>
+          <a:fontRef idx="minor">
+            <a:schemeClr val="lt1"/>
+          </a:fontRef>
+        </p:style>
+        <p:txBody>
+          <a:bodyPr rtlCol="0" anchor="ctr"/>
+          <a:lstStyle/>
+          <a:p>
+            <a:r>
+              <a:rPr lang="en-US" dirty="0">
+                <a:latin typeface="Calibri Light" panose="020F0302020204030204" pitchFamily="34" charset="0"/>
+                <a:cs typeface="Calibri Light" panose="020F0302020204030204" pitchFamily="34" charset="0"/>
+              </a:rPr>
+              <a:t>Look them up in scikit-learn!</a:t>
+            </a:r>
+          </a:p>
+        </p:txBody>
+      </p:sp>
+    </p:spTree>
+    <p:extLst>
+      <p:ext uri="{BB962C8B-B14F-4D97-AF65-F5344CB8AC3E}">
+        <p14:creationId xmlns:p14="http://schemas.microsoft.com/office/powerpoint/2010/main" val="277553306"/>
+      </p:ext>
+    </p:extLst>
+  </p:cSld>
+  <p:clrMapOvr>
+    <a:masterClrMapping/>
+  </p:clrMapOvr>
+  <p:timing>
+    <p:tnLst>
+      <p:par>
+        <p:cTn id="1" dur="indefinite" restart="never" nodeType="tmRoot">
+          <p:childTnLst>
+            <p:seq concurrent="1" nextAc="seek">
+              <p:cTn id="2" dur="indefinite" nodeType="mainSeq">
+                <p:childTnLst>
+                  <p:par>
+                    <p:cTn id="3" fill="hold">
+                      <p:stCondLst>
+                        <p:cond delay="indefinite"/>
+                      </p:stCondLst>
+                      <p:childTnLst>
+                        <p:par>
+                          <p:cTn id="4" fill="hold">
+                            <p:stCondLst>
+                              <p:cond delay="0"/>
+                            </p:stCondLst>
+                            <p:childTnLst>
+                              <p:par>
+                                <p:cTn id="5" presetID="1" presetClass="entr" presetSubtype="0" fill="hold" nodeType="clickEffect">
+                                  <p:stCondLst>
+                                    <p:cond delay="0"/>
+                                  </p:stCondLst>
+                                  <p:childTnLst>
+                                    <p:set>
+                                      <p:cBhvr>
+                                        <p:cTn id="6" dur="1" fill="hold">
+                                          <p:stCondLst>
+                                            <p:cond delay="0"/>
+                                          </p:stCondLst>
+                                        </p:cTn>
+                                        <p:tgtEl>
+                                          <p:spTgt spid="4"/>
+                                        </p:tgtEl>
+                                        <p:attrNameLst>
+                                          <p:attrName>style.visibility</p:attrName>
+                                        </p:attrNameLst>
+                                      </p:cBhvr>
+                                      <p:to>
+                                        <p:strVal val="visible"/>
+                                      </p:to>
+                                    </p:set>
+                                  </p:childTnLst>
+                                </p:cTn>
+                              </p:par>
+                              <p:par>
+                                <p:cTn id="7" presetID="1" presetClass="entr" presetSubtype="0" fill="hold" grpId="0" nodeType="withEffect">
+                                  <p:stCondLst>
+                                    <p:cond delay="0"/>
+                                  </p:stCondLst>
+                                  <p:childTnLst>
+                                    <p:set>
+                                      <p:cBhvr>
+                                        <p:cTn id="8" dur="1" fill="hold">
+                                          <p:stCondLst>
+                                            <p:cond delay="0"/>
+                                          </p:stCondLst>
+                                        </p:cTn>
+                                        <p:tgtEl>
+                                          <p:spTgt spid="7"/>
+                                        </p:tgtEl>
+                                        <p:attrNameLst>
+                                          <p:attrName>style.visibility</p:attrName>
+                                        </p:attrNameLst>
+                                      </p:cBhvr>
+                                      <p:to>
+                                        <p:strVal val="visible"/>
+                                      </p:to>
+                                    </p:set>
+                                  </p:childTnLst>
+                                </p:cTn>
+                              </p:par>
+                            </p:childTnLst>
+                          </p:cTn>
+                        </p:par>
+                      </p:childTnLst>
+                    </p:cTn>
+                  </p:par>
+                  <p:par>
+                    <p:cTn id="9" fill="hold">
+                      <p:stCondLst>
+                        <p:cond delay="indefinite"/>
+                      </p:stCondLst>
+                      <p:childTnLst>
+                        <p:par>
+                          <p:cTn id="10" fill="hold">
+                            <p:stCondLst>
+                              <p:cond delay="0"/>
+                            </p:stCondLst>
+                            <p:childTnLst>
+                              <p:par>
+                                <p:cTn id="11" presetID="1" presetClass="entr" presetSubtype="0" fill="hold" nodeType="clickEffect">
+                                  <p:stCondLst>
+                                    <p:cond delay="0"/>
+                                  </p:stCondLst>
+                                  <p:childTnLst>
+                                    <p:set>
+                                      <p:cBhvr>
+                                        <p:cTn id="12" dur="1" fill="hold">
+                                          <p:stCondLst>
+                                            <p:cond delay="0"/>
+                                          </p:stCondLst>
+                                        </p:cTn>
+                                        <p:tgtEl>
+                                          <p:spTgt spid="5"/>
+                                        </p:tgtEl>
+                                        <p:attrNameLst>
+                                          <p:attrName>style.visibility</p:attrName>
+                                        </p:attrNameLst>
+                                      </p:cBhvr>
+                                      <p:to>
+                                        <p:strVal val="visible"/>
+                                      </p:to>
+                                    </p:set>
+                                  </p:childTnLst>
+                                </p:cTn>
+                              </p:par>
+                              <p:par>
+                                <p:cTn id="13" presetID="1" presetClass="entr" presetSubtype="0" fill="hold" nodeType="withEffect">
+                                  <p:stCondLst>
+                                    <p:cond delay="0"/>
+                                  </p:stCondLst>
+                                  <p:childTnLst>
+                                    <p:set>
+                                      <p:cBhvr>
+                                        <p:cTn id="14" dur="1" fill="hold">
+                                          <p:stCondLst>
+                                            <p:cond delay="0"/>
+                                          </p:stCondLst>
+                                        </p:cTn>
+                                        <p:tgtEl>
+                                          <p:spTgt spid="6"/>
+                                        </p:tgtEl>
+                                        <p:attrNameLst>
+                                          <p:attrName>style.visibility</p:attrName>
+                                        </p:attrNameLst>
+                                      </p:cBhvr>
+                                      <p:to>
+                                        <p:strVal val="visible"/>
+                                      </p:to>
+                                    </p:set>
+                                  </p:childTnLst>
+                                </p:cTn>
+                              </p:par>
+                              <p:par>
+                                <p:cTn id="15" presetID="1" presetClass="entr" presetSubtype="0" fill="hold" grpId="0" nodeType="withEffect">
+                                  <p:stCondLst>
+                                    <p:cond delay="0"/>
+                                  </p:stCondLst>
+                                  <p:childTnLst>
+                                    <p:set>
+                                      <p:cBhvr>
+                                        <p:cTn id="16" dur="1" fill="hold">
+                                          <p:stCondLst>
+                                            <p:cond delay="0"/>
+                                          </p:stCondLst>
+                                        </p:cTn>
+                                        <p:tgtEl>
+                                          <p:spTgt spid="8"/>
+                                        </p:tgtEl>
+                                        <p:attrNameLst>
+                                          <p:attrName>style.visibility</p:attrName>
+                                        </p:attrNameLst>
+                                      </p:cBhvr>
+                                      <p:to>
+                                        <p:strVal val="visible"/>
+                                      </p:to>
+                                    </p:set>
+                                  </p:childTnLst>
+                                </p:cTn>
+                              </p:par>
+                            </p:childTnLst>
+                          </p:cTn>
+                        </p:par>
+                      </p:childTnLst>
+                    </p:cTn>
+                  </p:par>
+                  <p:par>
+                    <p:cTn id="17" fill="hold">
+                      <p:stCondLst>
+                        <p:cond delay="indefinite"/>
+                      </p:stCondLst>
+                      <p:childTnLst>
+                        <p:par>
+                          <p:cTn id="18" fill="hold">
+                            <p:stCondLst>
+                              <p:cond delay="0"/>
+                            </p:stCondLst>
+                            <p:childTnLst>
+                              <p:par>
+                                <p:cTn id="19" presetID="1" presetClass="entr" presetSubtype="0" fill="hold" grpId="0" nodeType="clickEffect">
+                                  <p:stCondLst>
+                                    <p:cond delay="0"/>
+                                  </p:stCondLst>
+                                  <p:childTnLst>
+                                    <p:set>
+                                      <p:cBhvr>
+                                        <p:cTn id="20" dur="1" fill="hold">
+                                          <p:stCondLst>
+                                            <p:cond delay="0"/>
+                                          </p:stCondLst>
+                                        </p:cTn>
+                                        <p:tgtEl>
+                                          <p:spTgt spid="9"/>
+                                        </p:tgtEl>
+                                        <p:attrNameLst>
+                                          <p:attrName>style.visibility</p:attrName>
+                                        </p:attrNameLst>
+                                      </p:cBhvr>
+                                      <p:to>
+                                        <p:strVal val="visible"/>
+                                      </p:to>
+                                    </p:set>
+                                  </p:childTnLst>
+                                </p:cTn>
+                              </p:par>
+                            </p:childTnLst>
+                          </p:cTn>
+                        </p:par>
+                      </p:childTnLst>
+                    </p:cTn>
+                  </p:par>
+                </p:childTnLst>
+              </p:cTn>
+              <p:prevCondLst>
+                <p:cond evt="onPrev" delay="0">
+                  <p:tgtEl>
+                    <p:sldTgt/>
+                  </p:tgtEl>
+                </p:cond>
+              </p:prevCondLst>
+              <p:nextCondLst>
+                <p:cond evt="onNext" delay="0">
+                  <p:tgtEl>
+                    <p:sldTgt/>
+                  </p:tgtEl>
+                </p:cond>
+              </p:nextCondLst>
+            </p:seq>
+          </p:childTnLst>
+        </p:cTn>
+      </p:par>
+    </p:tnLst>
+    <p:bldLst>
+      <p:bldP spid="7" grpId="0" animBg="1"/>
+      <p:bldP spid="8" grpId="0" animBg="1"/>
+      <p:bldP spid="9" grpId="0" animBg="1"/>
+    </p:bldLst>
+  </p:timing>
+</p:sld>
+</file>
+
+<file path=ppt/slides/slide45.xml><?xml version="1.0" encoding="utf-8"?>
 <p:sld xmlns:a="http://schemas.openxmlformats.org/drawingml/2006/main" xmlns:r="http://schemas.openxmlformats.org/officeDocument/2006/relationships" xmlns:p="http://schemas.openxmlformats.org/presentationml/2006/main">
   <p:cSld>
     <p:spTree>
@@ -19647,7 +20458,7 @@
 </p:sld>
 </file>
 
-<file path=ppt/slides/slide45.xml><?xml version="1.0" encoding="utf-8"?>
+<file path=ppt/slides/slide46.xml><?xml version="1.0" encoding="utf-8"?>
 <p:sld xmlns:a="http://schemas.openxmlformats.org/drawingml/2006/main" xmlns:r="http://schemas.openxmlformats.org/officeDocument/2006/relationships" xmlns:p="http://schemas.openxmlformats.org/presentationml/2006/main">
   <p:cSld>
     <p:spTree>
@@ -19749,7 +20560,7 @@
 </p:sld>
 </file>
 
-<file path=ppt/slides/slide46.xml><?xml version="1.0" encoding="utf-8"?>
+<file path=ppt/slides/slide47.xml><?xml version="1.0" encoding="utf-8"?>
 <p:sld xmlns:a="http://schemas.openxmlformats.org/drawingml/2006/main" xmlns:r="http://schemas.openxmlformats.org/officeDocument/2006/relationships" xmlns:p="http://schemas.openxmlformats.org/presentationml/2006/main">
   <p:cSld>
     <p:spTree>
@@ -20037,101 +20848,6 @@
 </p:sld>
 </file>
 
-<file path=ppt/slides/slide47.xml><?xml version="1.0" encoding="utf-8"?>
-<p:sld xmlns:a="http://schemas.openxmlformats.org/drawingml/2006/main" xmlns:r="http://schemas.openxmlformats.org/officeDocument/2006/relationships" xmlns:p="http://schemas.openxmlformats.org/presentationml/2006/main">
-  <p:cSld>
-    <p:spTree>
-      <p:nvGrpSpPr>
-        <p:cNvPr id="1" name=""/>
-        <p:cNvGrpSpPr/>
-        <p:nvPr/>
-      </p:nvGrpSpPr>
-      <p:grpSpPr>
-        <a:xfrm>
-          <a:off x="0" y="0"/>
-          <a:ext cx="0" cy="0"/>
-          <a:chOff x="0" y="0"/>
-          <a:chExt cx="0" cy="0"/>
-        </a:xfrm>
-      </p:grpSpPr>
-      <p:sp>
-        <p:nvSpPr>
-          <p:cNvPr id="2" name="Title 1">
-            <a:extLst>
-              <a:ext uri="{FF2B5EF4-FFF2-40B4-BE49-F238E27FC236}">
-                <a16:creationId xmlns:a16="http://schemas.microsoft.com/office/drawing/2014/main" id="{927FD44E-6130-2640-99CA-30743E11C2F6}"/>
-              </a:ext>
-            </a:extLst>
-          </p:cNvPr>
-          <p:cNvSpPr>
-            <a:spLocks noGrp="1"/>
-          </p:cNvSpPr>
-          <p:nvPr>
-            <p:ph type="title"/>
-          </p:nvPr>
-        </p:nvSpPr>
-        <p:spPr/>
-        <p:txBody>
-          <a:bodyPr/>
-          <a:lstStyle/>
-          <a:p>
-            <a:r>
-              <a:rPr lang="en-US" dirty="0"/>
-              <a:t>Advanced topics: Non-parametric</a:t>
-            </a:r>
-          </a:p>
-        </p:txBody>
-      </p:sp>
-      <p:sp>
-        <p:nvSpPr>
-          <p:cNvPr id="3" name="Content Placeholder 2">
-            <a:extLst>
-              <a:ext uri="{FF2B5EF4-FFF2-40B4-BE49-F238E27FC236}">
-                <a16:creationId xmlns:a16="http://schemas.microsoft.com/office/drawing/2014/main" id="{16B48867-D43A-6D44-AD27-635ED18DD269}"/>
-              </a:ext>
-            </a:extLst>
-          </p:cNvPr>
-          <p:cNvSpPr>
-            <a:spLocks noGrp="1"/>
-          </p:cNvSpPr>
-          <p:nvPr>
-            <p:ph idx="1"/>
-          </p:nvPr>
-        </p:nvSpPr>
-        <p:spPr/>
-        <p:txBody>
-          <a:bodyPr/>
-          <a:lstStyle/>
-          <a:p>
-            <a:r>
-              <a:rPr lang="en-US" sz="3200" dirty="0"/>
-              <a:t>Parametric models: a fixed set of model parameters regardless of sample size.</a:t>
-            </a:r>
-          </a:p>
-          <a:p>
-            <a:endParaRPr lang="en-US" sz="3200" dirty="0"/>
-          </a:p>
-          <a:p>
-            <a:r>
-              <a:rPr lang="en-US" sz="3200" dirty="0"/>
-              <a:t>E.g., a linear regression with 4 variables will have 4 slopes and 1 intercept (as well as the error term variance) no matter how many rows we have</a:t>
-            </a:r>
-          </a:p>
-        </p:txBody>
-      </p:sp>
-    </p:spTree>
-    <p:extLst>
-      <p:ext uri="{BB962C8B-B14F-4D97-AF65-F5344CB8AC3E}">
-        <p14:creationId xmlns:p14="http://schemas.microsoft.com/office/powerpoint/2010/main" val="955125347"/>
-      </p:ext>
-    </p:extLst>
-  </p:cSld>
-  <p:clrMapOvr>
-    <a:masterClrMapping/>
-  </p:clrMapOvr>
-</p:sld>
-</file>
-
 <file path=ppt/slides/slide48.xml><?xml version="1.0" encoding="utf-8"?>
 <p:sld xmlns:a="http://schemas.openxmlformats.org/drawingml/2006/main" xmlns:r="http://schemas.openxmlformats.org/officeDocument/2006/relationships" xmlns:p="http://schemas.openxmlformats.org/presentationml/2006/main">
   <p:cSld>
@@ -20200,7 +20916,7 @@
           <a:p>
             <a:r>
               <a:rPr lang="en-US" sz="3200" dirty="0"/>
-              <a:t>Non-Parametric models: a dynamic number of model parameters given different sample sizes.</a:t>
+              <a:t>Parametric models: a fixed set of model parameters regardless of sample size.</a:t>
             </a:r>
           </a:p>
           <a:p>
@@ -20209,34 +20925,7 @@
           <a:p>
             <a:r>
               <a:rPr lang="en-US" sz="3200" dirty="0"/>
-              <a:t>E.g., Gaussian Process</a:t>
-            </a:r>
-          </a:p>
-          <a:p>
-            <a:pPr lvl="1"/>
-            <a:r>
-              <a:rPr lang="en-US" sz="2800" dirty="0"/>
-              <a:t>It models the target using a mixture of Gaussian distributions.</a:t>
-            </a:r>
-          </a:p>
-          <a:p>
-            <a:pPr lvl="1"/>
-            <a:r>
-              <a:rPr lang="en-US" sz="2800" dirty="0"/>
-              <a:t>Good tutorial on this if interested (optional):</a:t>
-            </a:r>
-          </a:p>
-          <a:p>
-            <a:pPr lvl="2"/>
-            <a:r>
-              <a:rPr lang="en-US" sz="2400" dirty="0">
-                <a:hlinkClick r:id="rId2"/>
-              </a:rPr>
-              <a:t>https://distill.pub/2019/visual-exploration-gaussian-processes/</a:t>
-            </a:r>
-            <a:r>
-              <a:rPr lang="en-US" sz="2400" dirty="0"/>
-              <a:t> </a:t>
+              <a:t>E.g., a linear regression with 4 variables will have 4 slopes and 1 intercept (as well as the error term variance) no matter how many rows we have</a:t>
             </a:r>
           </a:p>
         </p:txBody>
@@ -20244,7 +20933,7 @@
     </p:spTree>
     <p:extLst>
       <p:ext uri="{BB962C8B-B14F-4D97-AF65-F5344CB8AC3E}">
-        <p14:creationId xmlns:p14="http://schemas.microsoft.com/office/powerpoint/2010/main" val="676508727"/>
+        <p14:creationId xmlns:p14="http://schemas.microsoft.com/office/powerpoint/2010/main" val="955125347"/>
       </p:ext>
     </p:extLst>
   </p:cSld>
@@ -20276,7 +20965,7 @@
           <p:cNvPr id="2" name="Title 1">
             <a:extLst>
               <a:ext uri="{FF2B5EF4-FFF2-40B4-BE49-F238E27FC236}">
-                <a16:creationId xmlns:a16="http://schemas.microsoft.com/office/drawing/2014/main" id="{CA5B456E-F81A-264B-9956-DC5B057E53EE}"/>
+                <a16:creationId xmlns:a16="http://schemas.microsoft.com/office/drawing/2014/main" id="{927FD44E-6130-2640-99CA-30743E11C2F6}"/>
               </a:ext>
             </a:extLst>
           </p:cNvPr>
@@ -20294,47 +20983,79 @@
           <a:p>
             <a:r>
               <a:rPr lang="en-US" dirty="0"/>
-              <a:t>Example: GP regression</a:t>
+              <a:t>Advanced topics: Non-parametric</a:t>
             </a:r>
           </a:p>
         </p:txBody>
       </p:sp>
-      <p:pic>
-        <p:nvPicPr>
-          <p:cNvPr id="4" name="Content Placeholder 3">
-            <a:extLst>
-              <a:ext uri="{FF2B5EF4-FFF2-40B4-BE49-F238E27FC236}">
-                <a16:creationId xmlns:a16="http://schemas.microsoft.com/office/drawing/2014/main" id="{DB4F9546-A115-9342-B3B0-D27E2FFC8602}"/>
-              </a:ext>
-            </a:extLst>
-          </p:cNvPr>
-          <p:cNvPicPr>
-            <a:picLocks noGrp="1" noChangeAspect="1"/>
-          </p:cNvPicPr>
+      <p:sp>
+        <p:nvSpPr>
+          <p:cNvPr id="3" name="Content Placeholder 2">
+            <a:extLst>
+              <a:ext uri="{FF2B5EF4-FFF2-40B4-BE49-F238E27FC236}">
+                <a16:creationId xmlns:a16="http://schemas.microsoft.com/office/drawing/2014/main" id="{16B48867-D43A-6D44-AD27-635ED18DD269}"/>
+              </a:ext>
+            </a:extLst>
+          </p:cNvPr>
+          <p:cNvSpPr>
+            <a:spLocks noGrp="1"/>
+          </p:cNvSpPr>
           <p:nvPr>
             <p:ph idx="1"/>
           </p:nvPr>
-        </p:nvPicPr>
-        <p:blipFill>
-          <a:blip r:embed="rId2"/>
-          <a:stretch>
-            <a:fillRect/>
-          </a:stretch>
-        </p:blipFill>
-        <p:spPr>
-          <a:xfrm>
-            <a:off x="452652" y="1630807"/>
-            <a:ext cx="8229600" cy="5204012"/>
-          </a:xfrm>
-          <a:prstGeom prst="rect">
-            <a:avLst/>
-          </a:prstGeom>
-        </p:spPr>
-      </p:pic>
+        </p:nvSpPr>
+        <p:spPr/>
+        <p:txBody>
+          <a:bodyPr/>
+          <a:lstStyle/>
+          <a:p>
+            <a:r>
+              <a:rPr lang="en-US" sz="3200" dirty="0"/>
+              <a:t>Non-Parametric models: a dynamic number of model parameters given different sample sizes.</a:t>
+            </a:r>
+          </a:p>
+          <a:p>
+            <a:endParaRPr lang="en-US" sz="3200" dirty="0"/>
+          </a:p>
+          <a:p>
+            <a:r>
+              <a:rPr lang="en-US" sz="3200" dirty="0"/>
+              <a:t>E.g., Gaussian Process</a:t>
+            </a:r>
+          </a:p>
+          <a:p>
+            <a:pPr lvl="1"/>
+            <a:r>
+              <a:rPr lang="en-US" sz="2800" dirty="0"/>
+              <a:t>It models the target using a mixture of Gaussian distributions.</a:t>
+            </a:r>
+          </a:p>
+          <a:p>
+            <a:pPr lvl="1"/>
+            <a:r>
+              <a:rPr lang="en-US" sz="2800" dirty="0"/>
+              <a:t>Good tutorial on this if interested (optional):</a:t>
+            </a:r>
+          </a:p>
+          <a:p>
+            <a:pPr lvl="2"/>
+            <a:r>
+              <a:rPr lang="en-US" sz="2400" dirty="0">
+                <a:hlinkClick r:id="rId2"/>
+              </a:rPr>
+              <a:t>https://distill.pub/2019/visual-exploration-gaussian-processes/</a:t>
+            </a:r>
+            <a:r>
+              <a:rPr lang="en-US" sz="2400" dirty="0"/>
+              <a:t> </a:t>
+            </a:r>
+          </a:p>
+        </p:txBody>
+      </p:sp>
     </p:spTree>
     <p:extLst>
       <p:ext uri="{BB962C8B-B14F-4D97-AF65-F5344CB8AC3E}">
-        <p14:creationId xmlns:p14="http://schemas.microsoft.com/office/powerpoint/2010/main" val="1669970555"/>
+        <p14:creationId xmlns:p14="http://schemas.microsoft.com/office/powerpoint/2010/main" val="676508727"/>
       </p:ext>
     </p:extLst>
   </p:cSld>
@@ -20448,7 +21169,13 @@
           <p:nvPr/>
         </p:nvPicPr>
         <p:blipFill>
-          <a:blip r:embed="rId3"/>
+          <a:blip r:embed="rId3" cstate="screen">
+            <a:extLst>
+              <a:ext uri="{28A0092B-C50C-407E-A947-70E740481C1C}">
+                <a14:useLocalDpi xmlns:a14="http://schemas.microsoft.com/office/drawing/2010/main"/>
+              </a:ext>
+            </a:extLst>
+          </a:blip>
           <a:stretch>
             <a:fillRect/>
           </a:stretch>
@@ -20498,6 +21225,96 @@
           <p:cNvPr id="2" name="Title 1">
             <a:extLst>
               <a:ext uri="{FF2B5EF4-FFF2-40B4-BE49-F238E27FC236}">
+                <a16:creationId xmlns:a16="http://schemas.microsoft.com/office/drawing/2014/main" id="{CA5B456E-F81A-264B-9956-DC5B057E53EE}"/>
+              </a:ext>
+            </a:extLst>
+          </p:cNvPr>
+          <p:cNvSpPr>
+            <a:spLocks noGrp="1"/>
+          </p:cNvSpPr>
+          <p:nvPr>
+            <p:ph type="title"/>
+          </p:nvPr>
+        </p:nvSpPr>
+        <p:spPr/>
+        <p:txBody>
+          <a:bodyPr/>
+          <a:lstStyle/>
+          <a:p>
+            <a:r>
+              <a:rPr lang="en-US" dirty="0"/>
+              <a:t>Example: GP regression</a:t>
+            </a:r>
+          </a:p>
+        </p:txBody>
+      </p:sp>
+      <p:pic>
+        <p:nvPicPr>
+          <p:cNvPr id="4" name="Content Placeholder 3">
+            <a:extLst>
+              <a:ext uri="{FF2B5EF4-FFF2-40B4-BE49-F238E27FC236}">
+                <a16:creationId xmlns:a16="http://schemas.microsoft.com/office/drawing/2014/main" id="{DB4F9546-A115-9342-B3B0-D27E2FFC8602}"/>
+              </a:ext>
+            </a:extLst>
+          </p:cNvPr>
+          <p:cNvPicPr>
+            <a:picLocks noGrp="1" noChangeAspect="1"/>
+          </p:cNvPicPr>
+          <p:nvPr>
+            <p:ph idx="1"/>
+          </p:nvPr>
+        </p:nvPicPr>
+        <p:blipFill>
+          <a:blip r:embed="rId2"/>
+          <a:stretch>
+            <a:fillRect/>
+          </a:stretch>
+        </p:blipFill>
+        <p:spPr>
+          <a:xfrm>
+            <a:off x="452652" y="1630807"/>
+            <a:ext cx="8229600" cy="5204012"/>
+          </a:xfrm>
+          <a:prstGeom prst="rect">
+            <a:avLst/>
+          </a:prstGeom>
+        </p:spPr>
+      </p:pic>
+    </p:spTree>
+    <p:extLst>
+      <p:ext uri="{BB962C8B-B14F-4D97-AF65-F5344CB8AC3E}">
+        <p14:creationId xmlns:p14="http://schemas.microsoft.com/office/powerpoint/2010/main" val="1669970555"/>
+      </p:ext>
+    </p:extLst>
+  </p:cSld>
+  <p:clrMapOvr>
+    <a:masterClrMapping/>
+  </p:clrMapOvr>
+</p:sld>
+</file>
+
+<file path=ppt/slides/slide51.xml><?xml version="1.0" encoding="utf-8"?>
+<p:sld xmlns:a="http://schemas.openxmlformats.org/drawingml/2006/main" xmlns:r="http://schemas.openxmlformats.org/officeDocument/2006/relationships" xmlns:p="http://schemas.openxmlformats.org/presentationml/2006/main">
+  <p:cSld>
+    <p:spTree>
+      <p:nvGrpSpPr>
+        <p:cNvPr id="1" name=""/>
+        <p:cNvGrpSpPr/>
+        <p:nvPr/>
+      </p:nvGrpSpPr>
+      <p:grpSpPr>
+        <a:xfrm>
+          <a:off x="0" y="0"/>
+          <a:ext cx="0" cy="0"/>
+          <a:chOff x="0" y="0"/>
+          <a:chExt cx="0" cy="0"/>
+        </a:xfrm>
+      </p:grpSpPr>
+      <p:sp>
+        <p:nvSpPr>
+          <p:cNvPr id="2" name="Title 1">
+            <a:extLst>
+              <a:ext uri="{FF2B5EF4-FFF2-40B4-BE49-F238E27FC236}">
                 <a16:creationId xmlns:a16="http://schemas.microsoft.com/office/drawing/2014/main" id="{117C3756-8FC0-A24C-A4F9-3692527ED6CD}"/>
               </a:ext>
             </a:extLst>
@@ -20589,7 +21406,7 @@
 </p:sld>
 </file>
 
-<file path=ppt/slides/slide51.xml><?xml version="1.0" encoding="utf-8"?>
+<file path=ppt/slides/slide52.xml><?xml version="1.0" encoding="utf-8"?>
 <p:sld xmlns:a="http://schemas.openxmlformats.org/drawingml/2006/main" xmlns:r="http://schemas.openxmlformats.org/officeDocument/2006/relationships" xmlns:p="http://schemas.openxmlformats.org/presentationml/2006/main">
   <p:cSld>
     <p:bg>

</xml_diff>

<commit_message>
slight adjustment of week 8 slides
</commit_message>
<xml_diff>
--- a/Week-6-Regresion/IS6400 Week 6.pptx
+++ b/Week-6-Regresion/IS6400 Week 6.pptx
@@ -339,7 +339,7 @@
               <a:pPr>
                 <a:defRPr/>
               </a:pPr>
-              <a:t>2022/3/5</a:t>
+              <a:t>2022/3/7</a:t>
             </a:fld>
             <a:endParaRPr lang="zh-TW" altLang="en-US"/>
           </a:p>
@@ -580,7 +580,7 @@
               <a:pPr>
                 <a:defRPr/>
               </a:pPr>
-              <a:t>3/5/22</a:t>
+              <a:t>3/7/22</a:t>
             </a:fld>
             <a:endParaRPr lang="en-US" dirty="0"/>
           </a:p>

</xml_diff>